<commit_message>
Finished speech pointers added to Interim Group Report
</commit_message>
<xml_diff>
--- a/Interim Client Presentation.pptx
+++ b/Interim Client Presentation.pptx
@@ -5,25 +5,26 @@
     <p:sldMasterId id="2147483840" r:id="rId1"/>
   </p:sldMasterIdLst>
   <p:notesMasterIdLst>
-    <p:notesMasterId r:id="rId18"/>
+    <p:notesMasterId r:id="rId19"/>
   </p:notesMasterIdLst>
   <p:sldIdLst>
     <p:sldId id="256" r:id="rId2"/>
     <p:sldId id="257" r:id="rId3"/>
     <p:sldId id="270" r:id="rId4"/>
     <p:sldId id="258" r:id="rId5"/>
-    <p:sldId id="259" r:id="rId6"/>
-    <p:sldId id="265" r:id="rId7"/>
-    <p:sldId id="267" r:id="rId8"/>
-    <p:sldId id="268" r:id="rId9"/>
-    <p:sldId id="266" r:id="rId10"/>
-    <p:sldId id="271" r:id="rId11"/>
-    <p:sldId id="269" r:id="rId12"/>
-    <p:sldId id="260" r:id="rId13"/>
-    <p:sldId id="261" r:id="rId14"/>
-    <p:sldId id="262" r:id="rId15"/>
-    <p:sldId id="263" r:id="rId16"/>
-    <p:sldId id="264" r:id="rId17"/>
+    <p:sldId id="272" r:id="rId6"/>
+    <p:sldId id="259" r:id="rId7"/>
+    <p:sldId id="265" r:id="rId8"/>
+    <p:sldId id="267" r:id="rId9"/>
+    <p:sldId id="268" r:id="rId10"/>
+    <p:sldId id="266" r:id="rId11"/>
+    <p:sldId id="271" r:id="rId12"/>
+    <p:sldId id="269" r:id="rId13"/>
+    <p:sldId id="260" r:id="rId14"/>
+    <p:sldId id="261" r:id="rId15"/>
+    <p:sldId id="262" r:id="rId16"/>
+    <p:sldId id="263" r:id="rId17"/>
+    <p:sldId id="264" r:id="rId18"/>
   </p:sldIdLst>
   <p:sldSz cx="12192000" cy="6858000"/>
   <p:notesSz cx="6858000" cy="9144000"/>
@@ -212,7 +213,7 @@
           <a:p>
             <a:fld id="{8DFF4AB7-F8C2-3F4E-99B2-B428786D1811}" type="datetimeFigureOut">
               <a:rPr lang="en-US" smtClean="0"/>
-              <a:t>10/25/17</a:t>
+              <a:t>11/13/17</a:t>
             </a:fld>
             <a:endParaRPr lang="en-US"/>
           </a:p>
@@ -732,7 +733,55 @@
           <a:bodyPr/>
           <a:lstStyle/>
           <a:p>
-            <a:endParaRPr lang="en-US"/>
+            <a:r>
+              <a:rPr lang="en-US" dirty="0" smtClean="0"/>
+              <a:t>-Agile approach</a:t>
+            </a:r>
+          </a:p>
+          <a:p>
+            <a:r>
+              <a:rPr lang="en-US" dirty="0" smtClean="0"/>
+              <a:t>-Main method of managing was Trello</a:t>
+            </a:r>
+          </a:p>
+          <a:p>
+            <a:r>
+              <a:rPr lang="en-US" dirty="0" smtClean="0"/>
+              <a:t>	-broke</a:t>
+            </a:r>
+            <a:r>
+              <a:rPr lang="en-US" baseline="0" dirty="0" smtClean="0"/>
+              <a:t> task into parts</a:t>
+            </a:r>
+          </a:p>
+          <a:p>
+            <a:r>
+              <a:rPr lang="en-US" baseline="0" dirty="0" smtClean="0"/>
+              <a:t>-Flexible</a:t>
+            </a:r>
+          </a:p>
+          <a:p>
+            <a:r>
+              <a:rPr lang="en-US" baseline="0" dirty="0" smtClean="0"/>
+              <a:t>-Easy to use</a:t>
+            </a:r>
+          </a:p>
+          <a:p>
+            <a:r>
+              <a:rPr lang="en-US" dirty="0" smtClean="0"/>
+              <a:t>-Quick to deploy</a:t>
+            </a:r>
+          </a:p>
+          <a:p>
+            <a:r>
+              <a:rPr lang="en-US" dirty="0" smtClean="0"/>
+              <a:t>-Considered</a:t>
+            </a:r>
+            <a:r>
+              <a:rPr lang="en-US" baseline="0" dirty="0" smtClean="0"/>
+              <a:t> for group project plugin in future</a:t>
+            </a:r>
+            <a:endParaRPr lang="en-US" dirty="0"/>
           </a:p>
         </p:txBody>
       </p:sp>
@@ -818,22 +867,60 @@
           <a:p>
             <a:r>
               <a:rPr lang="en-US" dirty="0" smtClean="0"/>
-              <a:t>To approach this problem I split the teams, as mentioned earlier.</a:t>
+              <a:t>-Quizzes</a:t>
             </a:r>
             <a:r>
               <a:rPr lang="en-US" baseline="0" dirty="0" smtClean="0"/>
-              <a:t> Then we held a meeting to discuss the possible solutions to match the problem. We split these into 4 major categories to lay the groundwork for the client.</a:t>
-            </a:r>
-          </a:p>
-          <a:p>
-            <a:endParaRPr lang="en-US" baseline="0" dirty="0" smtClean="0"/>
+              <a:t> based on relevant questions to the project</a:t>
+            </a:r>
           </a:p>
           <a:p>
             <a:r>
               <a:rPr lang="en-US" baseline="0" dirty="0" smtClean="0"/>
-              <a:t>This is the File Upload System, these are some of the ideas the team came up with. </a:t>
-            </a:r>
-            <a:endParaRPr lang="en-US" dirty="0"/>
+              <a:t>	-Or relevant code (Java, Python, Project management)</a:t>
+            </a:r>
+          </a:p>
+          <a:p>
+            <a:r>
+              <a:rPr lang="en-US" baseline="0" dirty="0" smtClean="0"/>
+              <a:t>		-Clients experience was that it didn’t matter a lot if all the </a:t>
+            </a:r>
+          </a:p>
+          <a:p>
+            <a:r>
+              <a:rPr lang="en-US" baseline="0" dirty="0" smtClean="0"/>
+              <a:t>		-Cognitive tests, way of testing for memory, perception</a:t>
+            </a:r>
+          </a:p>
+          <a:p>
+            <a:r>
+              <a:rPr lang="en-US" baseline="0" dirty="0" smtClean="0"/>
+              <a:t>	-Testing for personality types through quizzes</a:t>
+            </a:r>
+          </a:p>
+          <a:p>
+            <a:r>
+              <a:rPr lang="en-US" baseline="0" dirty="0" smtClean="0"/>
+              <a:t>	-Fun, game or something interactive</a:t>
+            </a:r>
+          </a:p>
+          <a:p>
+            <a:r>
+              <a:rPr lang="en-US" baseline="0" dirty="0" smtClean="0"/>
+              <a:t>	-Abstract methods of measuring Emotional intelligence</a:t>
+            </a:r>
+          </a:p>
+          <a:p>
+            <a:r>
+              <a:rPr lang="en-US" baseline="0" dirty="0" smtClean="0"/>
+              <a:t>-Opportunities to write a project for your own group</a:t>
+            </a:r>
+          </a:p>
+          <a:p>
+            <a:r>
+              <a:rPr lang="en-US" baseline="0" dirty="0" smtClean="0"/>
+              <a:t>	-Potentially allow groups to come up with and submit own project</a:t>
+            </a:r>
           </a:p>
         </p:txBody>
       </p:sp>
@@ -863,7 +950,7 @@
     </p:spTree>
     <p:extLst>
       <p:ext uri="{BB962C8B-B14F-4D97-AF65-F5344CB8AC3E}">
-        <p14:creationId xmlns:p14="http://schemas.microsoft.com/office/powerpoint/2010/main" val="1450660965"/>
+        <p14:creationId xmlns:p14="http://schemas.microsoft.com/office/powerpoint/2010/main" val="996311281"/>
       </p:ext>
     </p:extLst>
   </p:cSld>
@@ -919,11 +1006,20 @@
           <a:p>
             <a:r>
               <a:rPr lang="en-US" dirty="0" smtClean="0"/>
-              <a:t>This is the Grouping tool, this is another feature the</a:t>
+              <a:t>To approach this problem I split the teams, as mentioned earlier.</a:t>
             </a:r>
             <a:r>
               <a:rPr lang="en-US" baseline="0" dirty="0" smtClean="0"/>
-              <a:t> client felt was important, so we spoke in a group meeting and felt it was best to produce a </a:t>
+              <a:t> Then we held a meeting to discuss the possible solutions to match the problem. We split these into 4 major categories to lay the groundwork for the client.</a:t>
+            </a:r>
+          </a:p>
+          <a:p>
+            <a:endParaRPr lang="en-US" baseline="0" dirty="0" smtClean="0"/>
+          </a:p>
+          <a:p>
+            <a:r>
+              <a:rPr lang="en-US" baseline="0" dirty="0" smtClean="0"/>
+              <a:t>This is the File Upload System, these are some of the ideas the team came up with. </a:t>
             </a:r>
             <a:endParaRPr lang="en-US" dirty="0"/>
           </a:p>
@@ -955,7 +1051,7 @@
     </p:spTree>
     <p:extLst>
       <p:ext uri="{BB962C8B-B14F-4D97-AF65-F5344CB8AC3E}">
-        <p14:creationId xmlns:p14="http://schemas.microsoft.com/office/powerpoint/2010/main" val="1576346345"/>
+        <p14:creationId xmlns:p14="http://schemas.microsoft.com/office/powerpoint/2010/main" val="1450660965"/>
       </p:ext>
     </p:extLst>
   </p:cSld>
@@ -1011,11 +1107,11 @@
           <a:p>
             <a:r>
               <a:rPr lang="en-US" dirty="0" smtClean="0"/>
-              <a:t>The Project Tools thread is a little crowded</a:t>
+              <a:t>This is the Grouping tool, this is another feature the</a:t>
             </a:r>
             <a:r>
               <a:rPr lang="en-US" baseline="0" dirty="0" smtClean="0"/>
-              <a:t> but essentially includes a large selection of tools. These tools we will revisit in future iterations of the project</a:t>
+              <a:t> client felt was important, so we spoke in a group meeting and felt it was best to produce a </a:t>
             </a:r>
             <a:endParaRPr lang="en-US" dirty="0"/>
           </a:p>
@@ -1047,7 +1143,7 @@
     </p:spTree>
     <p:extLst>
       <p:ext uri="{BB962C8B-B14F-4D97-AF65-F5344CB8AC3E}">
-        <p14:creationId xmlns:p14="http://schemas.microsoft.com/office/powerpoint/2010/main" val="460439137"/>
+        <p14:creationId xmlns:p14="http://schemas.microsoft.com/office/powerpoint/2010/main" val="1576346345"/>
       </p:ext>
     </p:extLst>
   </p:cSld>
@@ -1103,6 +1199,98 @@
           <a:p>
             <a:r>
               <a:rPr lang="en-US" dirty="0" smtClean="0"/>
+              <a:t>The Project Tools thread is a little crowded</a:t>
+            </a:r>
+            <a:r>
+              <a:rPr lang="en-US" baseline="0" dirty="0" smtClean="0"/>
+              <a:t> but essentially includes a large selection of tools. These tools we will revisit in future iterations of the project</a:t>
+            </a:r>
+            <a:endParaRPr lang="en-US" dirty="0"/>
+          </a:p>
+        </p:txBody>
+      </p:sp>
+      <p:sp>
+        <p:nvSpPr>
+          <p:cNvPr id="4" name="Slide Number Placeholder 3"/>
+          <p:cNvSpPr>
+            <a:spLocks noGrp="1"/>
+          </p:cNvSpPr>
+          <p:nvPr>
+            <p:ph type="sldNum" sz="quarter" idx="10"/>
+          </p:nvPr>
+        </p:nvSpPr>
+        <p:spPr/>
+        <p:txBody>
+          <a:bodyPr/>
+          <a:lstStyle/>
+          <a:p>
+            <a:fld id="{5C5D8E94-4ED2-C745-8047-EBA2DE44874C}" type="slidenum">
+              <a:rPr lang="en-US" smtClean="0"/>
+              <a:t>8</a:t>
+            </a:fld>
+            <a:endParaRPr lang="en-US"/>
+          </a:p>
+        </p:txBody>
+      </p:sp>
+    </p:spTree>
+    <p:extLst>
+      <p:ext uri="{BB962C8B-B14F-4D97-AF65-F5344CB8AC3E}">
+        <p14:creationId xmlns:p14="http://schemas.microsoft.com/office/powerpoint/2010/main" val="460439137"/>
+      </p:ext>
+    </p:extLst>
+  </p:cSld>
+  <p:clrMapOvr>
+    <a:masterClrMapping/>
+  </p:clrMapOvr>
+</p:notes>
+</file>
+
+<file path=ppt/notesSlides/notesSlide8.xml><?xml version="1.0" encoding="utf-8"?>
+<p:notes xmlns:a="http://schemas.openxmlformats.org/drawingml/2006/main" xmlns:r="http://schemas.openxmlformats.org/officeDocument/2006/relationships" xmlns:p="http://schemas.openxmlformats.org/presentationml/2006/main">
+  <p:cSld>
+    <p:spTree>
+      <p:nvGrpSpPr>
+        <p:cNvPr id="1" name=""/>
+        <p:cNvGrpSpPr/>
+        <p:nvPr/>
+      </p:nvGrpSpPr>
+      <p:grpSpPr>
+        <a:xfrm>
+          <a:off x="0" y="0"/>
+          <a:ext cx="0" cy="0"/>
+          <a:chOff x="0" y="0"/>
+          <a:chExt cx="0" cy="0"/>
+        </a:xfrm>
+      </p:grpSpPr>
+      <p:sp>
+        <p:nvSpPr>
+          <p:cNvPr id="2" name="Slide Image Placeholder 1"/>
+          <p:cNvSpPr>
+            <a:spLocks noGrp="1" noRot="1" noChangeAspect="1"/>
+          </p:cNvSpPr>
+          <p:nvPr>
+            <p:ph type="sldImg"/>
+          </p:nvPr>
+        </p:nvSpPr>
+        <p:spPr/>
+      </p:sp>
+      <p:sp>
+        <p:nvSpPr>
+          <p:cNvPr id="3" name="Notes Placeholder 2"/>
+          <p:cNvSpPr>
+            <a:spLocks noGrp="1"/>
+          </p:cNvSpPr>
+          <p:nvPr>
+            <p:ph type="body" idx="1"/>
+          </p:nvPr>
+        </p:nvSpPr>
+        <p:spPr/>
+        <p:txBody>
+          <a:bodyPr/>
+          <a:lstStyle/>
+          <a:p>
+            <a:r>
+              <a:rPr lang="en-US" dirty="0" smtClean="0"/>
               <a:t>These</a:t>
             </a:r>
             <a:r>
@@ -1130,7 +1318,7 @@
           <a:p>
             <a:fld id="{5C5D8E94-4ED2-C745-8047-EBA2DE44874C}" type="slidenum">
               <a:rPr lang="en-US" smtClean="0"/>
-              <a:t>8</a:t>
+              <a:t>9</a:t>
             </a:fld>
             <a:endParaRPr lang="en-US"/>
           </a:p>
@@ -1317,7 +1505,7 @@
           <a:p>
             <a:fld id="{9E016143-E03C-4CFD-AFDC-14E5BDEA754C}" type="datetimeFigureOut">
               <a:rPr lang="en-US" dirty="0"/>
-              <a:t>10/25/17</a:t>
+              <a:t>11/13/17</a:t>
             </a:fld>
             <a:endParaRPr lang="en-US" dirty="0"/>
           </a:p>
@@ -1541,7 +1729,7 @@
           <a:p>
             <a:fld id="{C033E54A-A8CA-48C1-9504-691B58049D29}" type="datetimeFigureOut">
               <a:rPr lang="en-US" dirty="0"/>
-              <a:t>10/25/17</a:t>
+              <a:t>11/13/17</a:t>
             </a:fld>
             <a:endParaRPr lang="en-US" dirty="0"/>
           </a:p>
@@ -1716,7 +1904,7 @@
           <a:p>
             <a:fld id="{B5F6C806-BBF7-471C-9527-881CE2266695}" type="datetimeFigureOut">
               <a:rPr lang="en-US" dirty="0"/>
-              <a:t>10/25/17</a:t>
+              <a:t>11/13/17</a:t>
             </a:fld>
             <a:endParaRPr lang="en-US" dirty="0"/>
           </a:p>
@@ -1881,7 +2069,7 @@
           <a:p>
             <a:fld id="{78C94063-DF36-4330-A365-08DA1FA5B7D6}" type="datetimeFigureOut">
               <a:rPr lang="en-US" dirty="0"/>
-              <a:t>10/25/17</a:t>
+              <a:t>11/13/17</a:t>
             </a:fld>
             <a:endParaRPr lang="en-US" dirty="0"/>
           </a:p>
@@ -2130,7 +2318,7 @@
           <a:p>
             <a:fld id="{908A7C6C-0F39-4D70-8E8D-FE5B9C95FA73}" type="datetimeFigureOut">
               <a:rPr lang="en-US" dirty="0"/>
-              <a:t>10/25/17</a:t>
+              <a:t>11/13/17</a:t>
             </a:fld>
             <a:endParaRPr lang="en-US" dirty="0"/>
           </a:p>
@@ -2451,7 +2639,7 @@
           <a:p>
             <a:fld id="{DFCFA4AC-08CC-42CE-BD01-C191750A04EC}" type="datetimeFigureOut">
               <a:rPr lang="en-US" dirty="0"/>
-              <a:t>10/25/17</a:t>
+              <a:t>11/13/17</a:t>
             </a:fld>
             <a:endParaRPr lang="en-US" dirty="0"/>
           </a:p>
@@ -2897,7 +3085,7 @@
           <a:p>
             <a:fld id="{1BA7A723-92A7-435B-B681-F25B092FEFEB}" type="datetimeFigureOut">
               <a:rPr lang="en-US" dirty="0"/>
-              <a:t>10/25/17</a:t>
+              <a:t>11/13/17</a:t>
             </a:fld>
             <a:endParaRPr lang="en-US" dirty="0"/>
           </a:p>
@@ -3010,7 +3198,7 @@
           <a:p>
             <a:fld id="{4F170639-886C-4FCF-9EAB-ABB5DA3F3F4A}" type="datetimeFigureOut">
               <a:rPr lang="en-US" dirty="0"/>
-              <a:t>10/25/17</a:t>
+              <a:t>11/13/17</a:t>
             </a:fld>
             <a:endParaRPr lang="en-US" dirty="0"/>
           </a:p>
@@ -3100,7 +3288,7 @@
           <a:p>
             <a:fld id="{22230651-31F4-45D2-98AE-A2108F41BC07}" type="datetimeFigureOut">
               <a:rPr lang="en-US" dirty="0"/>
-              <a:t>10/25/17</a:t>
+              <a:t>11/13/17</a:t>
             </a:fld>
             <a:endParaRPr lang="en-US" dirty="0"/>
           </a:p>
@@ -3382,7 +3570,7 @@
           <a:p>
             <a:fld id="{6F53789A-C914-4DB1-8815-80B5EC7335C5}" type="datetimeFigureOut">
               <a:rPr lang="en-US" dirty="0"/>
-              <a:t>10/25/17</a:t>
+              <a:t>11/13/17</a:t>
             </a:fld>
             <a:endParaRPr lang="en-US" dirty="0"/>
           </a:p>
@@ -3699,7 +3887,7 @@
           <a:p>
             <a:fld id="{5E6440AA-91A0-436F-8FDB-C0F939DCAE21}" type="datetimeFigureOut">
               <a:rPr lang="en-US" dirty="0"/>
-              <a:t>10/25/17</a:t>
+              <a:t>11/13/17</a:t>
             </a:fld>
             <a:endParaRPr lang="en-US" dirty="0"/>
           </a:p>
@@ -3948,7 +4136,7 @@
           <a:p>
             <a:fld id="{0E59FD0C-5451-4CA0-86AF-E70AE3279989}" type="datetimeFigureOut">
               <a:rPr lang="en-US" dirty="0"/>
-              <a:t>10/25/17</a:t>
+              <a:t>11/13/17</a:t>
             </a:fld>
             <a:endParaRPr lang="en-US" dirty="0"/>
           </a:p>
@@ -4528,7 +4716,7 @@
           <a:p>
             <a:r>
               <a:rPr lang="en-US" dirty="0" smtClean="0"/>
-              <a:t>System Requirements</a:t>
+              <a:t>Team 1 Criteria</a:t>
             </a:r>
             <a:endParaRPr lang="en-US" dirty="0"/>
           </a:p>
@@ -4549,14 +4737,55 @@
           <a:bodyPr/>
           <a:lstStyle/>
           <a:p>
-            <a:endParaRPr lang="en-US"/>
+            <a:r>
+              <a:rPr lang="en-US" dirty="0" smtClean="0"/>
+              <a:t>Sub divided</a:t>
+            </a:r>
+            <a:endParaRPr lang="en-US" dirty="0"/>
+          </a:p>
+          <a:p>
+            <a:pPr lvl="1"/>
+            <a:r>
+              <a:rPr lang="en-US" dirty="0" smtClean="0"/>
+              <a:t>2 teams</a:t>
+            </a:r>
+            <a:endParaRPr lang="en-US" dirty="0"/>
+          </a:p>
+          <a:p>
+            <a:endParaRPr lang="en-US" dirty="0" smtClean="0"/>
+          </a:p>
+        </p:txBody>
+      </p:sp>
+      <p:sp>
+        <p:nvSpPr>
+          <p:cNvPr id="4" name="TextBox 3"/>
+          <p:cNvSpPr txBox="1"/>
+          <p:nvPr/>
+        </p:nvSpPr>
+        <p:spPr>
+          <a:xfrm>
+            <a:off x="3238500" y="2343150"/>
+            <a:ext cx="184731" cy="369332"/>
+          </a:xfrm>
+          <a:prstGeom prst="rect">
+            <a:avLst/>
+          </a:prstGeom>
+          <a:noFill/>
+        </p:spPr>
+        <p:txBody>
+          <a:bodyPr wrap="none" rtlCol="0">
+            <a:spAutoFit/>
+          </a:bodyPr>
+          <a:lstStyle/>
+          <a:p>
+            <a:endParaRPr lang="en-US" dirty="0"/>
           </a:p>
         </p:txBody>
       </p:sp>
     </p:spTree>
     <p:extLst>
       <p:ext uri="{BB962C8B-B14F-4D97-AF65-F5344CB8AC3E}">
-        <p14:creationId xmlns:p14="http://schemas.microsoft.com/office/powerpoint/2010/main" val="1832044138"/>
+        <p14:creationId xmlns:p14="http://schemas.microsoft.com/office/powerpoint/2010/main" val="147267376"/>
       </p:ext>
     </p:extLst>
   </p:cSld>
@@ -4600,7 +4829,7 @@
           <a:p>
             <a:r>
               <a:rPr lang="en-US" dirty="0" smtClean="0"/>
-              <a:t>Team 2 Criteria</a:t>
+              <a:t>System Requirements</a:t>
             </a:r>
             <a:endParaRPr lang="en-US" dirty="0"/>
           </a:p>
@@ -4628,7 +4857,7 @@
     </p:spTree>
     <p:extLst>
       <p:ext uri="{BB962C8B-B14F-4D97-AF65-F5344CB8AC3E}">
-        <p14:creationId xmlns:p14="http://schemas.microsoft.com/office/powerpoint/2010/main" val="1717399770"/>
+        <p14:creationId xmlns:p14="http://schemas.microsoft.com/office/powerpoint/2010/main" val="1832044138"/>
       </p:ext>
     </p:extLst>
   </p:cSld>
@@ -4672,7 +4901,7 @@
           <a:p>
             <a:r>
               <a:rPr lang="en-US" dirty="0" smtClean="0"/>
-              <a:t>System Requirements</a:t>
+              <a:t>Team 2 Criteria</a:t>
             </a:r>
             <a:endParaRPr lang="en-US" dirty="0"/>
           </a:p>
@@ -4700,7 +4929,7 @@
     </p:spTree>
     <p:extLst>
       <p:ext uri="{BB962C8B-B14F-4D97-AF65-F5344CB8AC3E}">
-        <p14:creationId xmlns:p14="http://schemas.microsoft.com/office/powerpoint/2010/main" val="604210749"/>
+        <p14:creationId xmlns:p14="http://schemas.microsoft.com/office/powerpoint/2010/main" val="1717399770"/>
       </p:ext>
     </p:extLst>
   </p:cSld>
@@ -4744,7 +4973,7 @@
           <a:p>
             <a:r>
               <a:rPr lang="en-US" dirty="0" smtClean="0"/>
-              <a:t>Legal/Social</a:t>
+              <a:t>System Requirements</a:t>
             </a:r>
             <a:endParaRPr lang="en-US" dirty="0"/>
           </a:p>
@@ -4772,7 +5001,7 @@
     </p:spTree>
     <p:extLst>
       <p:ext uri="{BB962C8B-B14F-4D97-AF65-F5344CB8AC3E}">
-        <p14:creationId xmlns:p14="http://schemas.microsoft.com/office/powerpoint/2010/main" val="696099036"/>
+        <p14:creationId xmlns:p14="http://schemas.microsoft.com/office/powerpoint/2010/main" val="604210749"/>
       </p:ext>
     </p:extLst>
   </p:cSld>
@@ -4816,7 +5045,7 @@
           <a:p>
             <a:r>
               <a:rPr lang="en-US" dirty="0" smtClean="0"/>
-              <a:t>Ethical/Professional</a:t>
+              <a:t>Legal/Social</a:t>
             </a:r>
             <a:endParaRPr lang="en-US" dirty="0"/>
           </a:p>
@@ -4844,7 +5073,7 @@
     </p:spTree>
     <p:extLst>
       <p:ext uri="{BB962C8B-B14F-4D97-AF65-F5344CB8AC3E}">
-        <p14:creationId xmlns:p14="http://schemas.microsoft.com/office/powerpoint/2010/main" val="1740860548"/>
+        <p14:creationId xmlns:p14="http://schemas.microsoft.com/office/powerpoint/2010/main" val="696099036"/>
       </p:ext>
     </p:extLst>
   </p:cSld>
@@ -4888,6 +5117,78 @@
           <a:p>
             <a:r>
               <a:rPr lang="en-US" dirty="0" smtClean="0"/>
+              <a:t>Ethical/Professional</a:t>
+            </a:r>
+            <a:endParaRPr lang="en-US" dirty="0"/>
+          </a:p>
+        </p:txBody>
+      </p:sp>
+      <p:sp>
+        <p:nvSpPr>
+          <p:cNvPr id="3" name="Content Placeholder 2"/>
+          <p:cNvSpPr>
+            <a:spLocks noGrp="1"/>
+          </p:cNvSpPr>
+          <p:nvPr>
+            <p:ph idx="1"/>
+          </p:nvPr>
+        </p:nvSpPr>
+        <p:spPr/>
+        <p:txBody>
+          <a:bodyPr/>
+          <a:lstStyle/>
+          <a:p>
+            <a:endParaRPr lang="en-US"/>
+          </a:p>
+        </p:txBody>
+      </p:sp>
+    </p:spTree>
+    <p:extLst>
+      <p:ext uri="{BB962C8B-B14F-4D97-AF65-F5344CB8AC3E}">
+        <p14:creationId xmlns:p14="http://schemas.microsoft.com/office/powerpoint/2010/main" val="1740860548"/>
+      </p:ext>
+    </p:extLst>
+  </p:cSld>
+  <p:clrMapOvr>
+    <a:masterClrMapping/>
+  </p:clrMapOvr>
+</p:sld>
+</file>
+
+<file path=ppt/slides/slide16.xml><?xml version="1.0" encoding="utf-8"?>
+<p:sld xmlns:a="http://schemas.openxmlformats.org/drawingml/2006/main" xmlns:r="http://schemas.openxmlformats.org/officeDocument/2006/relationships" xmlns:p="http://schemas.openxmlformats.org/presentationml/2006/main">
+  <p:cSld>
+    <p:spTree>
+      <p:nvGrpSpPr>
+        <p:cNvPr id="1" name=""/>
+        <p:cNvGrpSpPr/>
+        <p:nvPr/>
+      </p:nvGrpSpPr>
+      <p:grpSpPr>
+        <a:xfrm>
+          <a:off x="0" y="0"/>
+          <a:ext cx="0" cy="0"/>
+          <a:chOff x="0" y="0"/>
+          <a:chExt cx="0" cy="0"/>
+        </a:xfrm>
+      </p:grpSpPr>
+      <p:sp>
+        <p:nvSpPr>
+          <p:cNvPr id="2" name="Title 1"/>
+          <p:cNvSpPr>
+            <a:spLocks noGrp="1"/>
+          </p:cNvSpPr>
+          <p:nvPr>
+            <p:ph type="title"/>
+          </p:nvPr>
+        </p:nvSpPr>
+        <p:spPr/>
+        <p:txBody>
+          <a:bodyPr/>
+          <a:lstStyle/>
+          <a:p>
+            <a:r>
+              <a:rPr lang="en-US" dirty="0" smtClean="0"/>
               <a:t>Summary</a:t>
             </a:r>
             <a:endParaRPr lang="en-US" dirty="0"/>
@@ -4926,7 +5227,7 @@
 </p:sld>
 </file>
 
-<file path=ppt/slides/slide16.xml><?xml version="1.0" encoding="utf-8"?>
+<file path=ppt/slides/slide17.xml><?xml version="1.0" encoding="utf-8"?>
 <p:sld xmlns:a="http://schemas.openxmlformats.org/drawingml/2006/main" xmlns:r="http://schemas.openxmlformats.org/officeDocument/2006/relationships" xmlns:p="http://schemas.openxmlformats.org/presentationml/2006/main">
   <p:cSld>
     <p:spTree>
@@ -5303,7 +5604,7 @@
           <a:p>
             <a:r>
               <a:rPr lang="en-US" dirty="0" smtClean="0"/>
-              <a:t>Criteria</a:t>
+              <a:t>Initial Criteria</a:t>
             </a:r>
             <a:endParaRPr lang="en-US" dirty="0"/>
           </a:p>
@@ -5324,7 +5625,107 @@
           <a:bodyPr/>
           <a:lstStyle/>
           <a:p>
-            <a:endParaRPr lang="en-US" dirty="0"/>
+            <a:r>
+              <a:rPr lang="en-US" dirty="0" smtClean="0"/>
+              <a:t>Full Management Tool</a:t>
+            </a:r>
+          </a:p>
+          <a:p>
+            <a:pPr lvl="1"/>
+            <a:r>
+              <a:rPr lang="en-US" dirty="0" smtClean="0"/>
+              <a:t>Blackboard </a:t>
+            </a:r>
+            <a:r>
+              <a:rPr lang="en-US" dirty="0" err="1" smtClean="0"/>
+              <a:t>Falldown</a:t>
+            </a:r>
+            <a:endParaRPr lang="en-US" dirty="0" smtClean="0"/>
+          </a:p>
+          <a:p>
+            <a:pPr lvl="1"/>
+            <a:r>
+              <a:rPr lang="en-US" dirty="0" smtClean="0"/>
+              <a:t>Manage people</a:t>
+            </a:r>
+          </a:p>
+          <a:p>
+            <a:pPr lvl="1"/>
+            <a:r>
+              <a:rPr lang="en-US" dirty="0" smtClean="0"/>
+              <a:t>Manage group project</a:t>
+            </a:r>
+          </a:p>
+          <a:p>
+            <a:r>
+              <a:rPr lang="en-US" dirty="0" smtClean="0"/>
+              <a:t>Easy to add to</a:t>
+            </a:r>
+          </a:p>
+          <a:p>
+            <a:r>
+              <a:rPr lang="en-US" dirty="0" smtClean="0"/>
+              <a:t>Communication methods</a:t>
+            </a:r>
+          </a:p>
+          <a:p>
+            <a:pPr lvl="1"/>
+            <a:r>
+              <a:rPr lang="en-US" dirty="0" smtClean="0"/>
+              <a:t>Email</a:t>
+            </a:r>
+          </a:p>
+          <a:p>
+            <a:pPr lvl="2"/>
+            <a:r>
+              <a:rPr lang="en-US" dirty="0" smtClean="0"/>
+              <a:t>Group messaging</a:t>
+            </a:r>
+            <a:endParaRPr lang="en-US" dirty="0"/>
+          </a:p>
+          <a:p>
+            <a:pPr lvl="1"/>
+            <a:r>
+              <a:rPr lang="en-US" dirty="0" smtClean="0"/>
+              <a:t>Messaging tool</a:t>
+            </a:r>
+          </a:p>
+          <a:p>
+            <a:pPr lvl="2"/>
+            <a:r>
+              <a:rPr lang="en-US" dirty="0" smtClean="0"/>
+              <a:t>Slack plugin</a:t>
+            </a:r>
+          </a:p>
+          <a:p>
+            <a:pPr lvl="1"/>
+            <a:r>
+              <a:rPr lang="en-US" dirty="0" smtClean="0"/>
+              <a:t>Message board format</a:t>
+            </a:r>
+          </a:p>
+          <a:p>
+            <a:pPr lvl="2"/>
+            <a:r>
+              <a:rPr lang="en-US" dirty="0" smtClean="0"/>
+              <a:t>Forum style</a:t>
+            </a:r>
+          </a:p>
+          <a:p>
+            <a:pPr lvl="2"/>
+            <a:r>
+              <a:rPr lang="en-US" dirty="0" smtClean="0"/>
+              <a:t>/R/</a:t>
+            </a:r>
+            <a:r>
+              <a:rPr lang="en-US" dirty="0" err="1" smtClean="0"/>
+              <a:t>GroupProjec</a:t>
+            </a:r>
+            <a:r>
+              <a:rPr lang="en-US" dirty="0" smtClean="0"/>
+              <a:t>/</a:t>
+            </a:r>
+            <a:endParaRPr lang="en-US" dirty="0" smtClean="0"/>
           </a:p>
         </p:txBody>
       </p:sp>
@@ -5342,6 +5743,214 @@
 </file>
 
 <file path=ppt/slides/slide5.xml><?xml version="1.0" encoding="utf-8"?>
+<p:sld xmlns:a="http://schemas.openxmlformats.org/drawingml/2006/main" xmlns:r="http://schemas.openxmlformats.org/officeDocument/2006/relationships" xmlns:p="http://schemas.openxmlformats.org/presentationml/2006/main">
+  <p:cSld>
+    <p:spTree>
+      <p:nvGrpSpPr>
+        <p:cNvPr id="1" name=""/>
+        <p:cNvGrpSpPr/>
+        <p:nvPr/>
+      </p:nvGrpSpPr>
+      <p:grpSpPr>
+        <a:xfrm>
+          <a:off x="0" y="0"/>
+          <a:ext cx="0" cy="0"/>
+          <a:chOff x="0" y="0"/>
+          <a:chExt cx="0" cy="0"/>
+        </a:xfrm>
+      </p:grpSpPr>
+      <p:sp>
+        <p:nvSpPr>
+          <p:cNvPr id="2" name="Title 1"/>
+          <p:cNvSpPr>
+            <a:spLocks noGrp="1"/>
+          </p:cNvSpPr>
+          <p:nvPr>
+            <p:ph type="title"/>
+          </p:nvPr>
+        </p:nvSpPr>
+        <p:spPr/>
+        <p:txBody>
+          <a:bodyPr/>
+          <a:lstStyle/>
+          <a:p>
+            <a:r>
+              <a:rPr lang="en-US" dirty="0" smtClean="0"/>
+              <a:t>Initial Criteria</a:t>
+            </a:r>
+            <a:endParaRPr lang="en-US" dirty="0"/>
+          </a:p>
+        </p:txBody>
+      </p:sp>
+      <p:sp>
+        <p:nvSpPr>
+          <p:cNvPr id="3" name="Content Placeholder 2"/>
+          <p:cNvSpPr>
+            <a:spLocks noGrp="1"/>
+          </p:cNvSpPr>
+          <p:nvPr>
+            <p:ph idx="1"/>
+          </p:nvPr>
+        </p:nvSpPr>
+        <p:spPr/>
+        <p:txBody>
+          <a:bodyPr/>
+          <a:lstStyle/>
+          <a:p>
+            <a:r>
+              <a:rPr lang="en-US" dirty="0" smtClean="0"/>
+              <a:t>Handling groups by experience</a:t>
+            </a:r>
+          </a:p>
+          <a:p>
+            <a:pPr lvl="1"/>
+            <a:r>
+              <a:rPr lang="en-US" dirty="0" smtClean="0"/>
+              <a:t>Personality testing</a:t>
+            </a:r>
+          </a:p>
+          <a:p>
+            <a:pPr lvl="2"/>
+            <a:r>
+              <a:rPr lang="en-US" dirty="0">
+                <a:solidFill>
+                  <a:schemeClr val="tx1"/>
+                </a:solidFill>
+              </a:rPr>
+              <a:t>Personality </a:t>
+            </a:r>
+            <a:r>
+              <a:rPr lang="en-US" dirty="0" smtClean="0">
+                <a:solidFill>
+                  <a:schemeClr val="tx1"/>
+                </a:solidFill>
+              </a:rPr>
+              <a:t>quiz</a:t>
+            </a:r>
+            <a:endParaRPr lang="en-US" dirty="0" smtClean="0"/>
+          </a:p>
+          <a:p>
+            <a:pPr lvl="1"/>
+            <a:r>
+              <a:rPr lang="en-US" dirty="0" smtClean="0"/>
+              <a:t>Experience testing</a:t>
+            </a:r>
+          </a:p>
+          <a:p>
+            <a:pPr lvl="2"/>
+            <a:r>
+              <a:rPr lang="en-US" dirty="0"/>
+              <a:t>Grade based </a:t>
+            </a:r>
+            <a:r>
+              <a:rPr lang="en-US" dirty="0" smtClean="0">
+                <a:solidFill>
+                  <a:srgbClr val="FF0000"/>
+                </a:solidFill>
+              </a:rPr>
+              <a:t>✗</a:t>
+            </a:r>
+          </a:p>
+          <a:p>
+            <a:pPr lvl="2"/>
+            <a:r>
+              <a:rPr lang="en-US" dirty="0" smtClean="0">
+                <a:solidFill>
+                  <a:schemeClr val="tx1"/>
+                </a:solidFill>
+              </a:rPr>
+              <a:t>Quiz based</a:t>
+            </a:r>
+          </a:p>
+          <a:p>
+            <a:pPr lvl="2"/>
+            <a:r>
+              <a:rPr lang="en-US" dirty="0" smtClean="0">
+                <a:solidFill>
+                  <a:schemeClr val="tx1"/>
+                </a:solidFill>
+              </a:rPr>
+              <a:t>Abstract overview of skills</a:t>
+            </a:r>
+          </a:p>
+          <a:p>
+            <a:pPr lvl="2"/>
+            <a:r>
+              <a:rPr lang="en-US" dirty="0" smtClean="0">
+                <a:solidFill>
+                  <a:schemeClr val="tx1"/>
+                </a:solidFill>
+              </a:rPr>
+              <a:t>Fun</a:t>
+            </a:r>
+          </a:p>
+          <a:p>
+            <a:pPr lvl="1"/>
+            <a:r>
+              <a:rPr lang="en-US" dirty="0" smtClean="0">
+                <a:solidFill>
+                  <a:schemeClr val="tx1"/>
+                </a:solidFill>
+              </a:rPr>
+              <a:t>Emotional intelligence testing</a:t>
+            </a:r>
+          </a:p>
+          <a:p>
+            <a:pPr lvl="2"/>
+            <a:r>
+              <a:rPr lang="en-US" dirty="0" smtClean="0">
+                <a:solidFill>
+                  <a:schemeClr val="tx1"/>
+                </a:solidFill>
+              </a:rPr>
+              <a:t>Method of </a:t>
+            </a:r>
+            <a:r>
+              <a:rPr lang="en-US" dirty="0"/>
+              <a:t> </a:t>
+            </a:r>
+            <a:r>
+              <a:rPr lang="en-US" dirty="0" smtClean="0"/>
+              <a:t>gauging personalities</a:t>
+            </a:r>
+            <a:endParaRPr lang="en-US" dirty="0">
+              <a:solidFill>
+                <a:schemeClr val="tx1"/>
+              </a:solidFill>
+            </a:endParaRPr>
+          </a:p>
+          <a:p>
+            <a:r>
+              <a:rPr lang="en-US" dirty="0" smtClean="0"/>
+              <a:t>Must be flexible on group members</a:t>
+            </a:r>
+          </a:p>
+          <a:p>
+            <a:pPr lvl="1"/>
+            <a:r>
+              <a:rPr lang="en-US" dirty="0" smtClean="0"/>
+              <a:t>Semi random sort</a:t>
+            </a:r>
+          </a:p>
+          <a:p>
+            <a:endParaRPr lang="en-US" dirty="0"/>
+          </a:p>
+        </p:txBody>
+      </p:sp>
+    </p:spTree>
+    <p:extLst>
+      <p:ext uri="{BB962C8B-B14F-4D97-AF65-F5344CB8AC3E}">
+        <p14:creationId xmlns:p14="http://schemas.microsoft.com/office/powerpoint/2010/main" val="478525993"/>
+      </p:ext>
+    </p:extLst>
+  </p:cSld>
+  <p:clrMapOvr>
+    <a:masterClrMapping/>
+  </p:clrMapOvr>
+</p:sld>
+</file>
+
+<file path=ppt/slides/slide6.xml><?xml version="1.0" encoding="utf-8"?>
 <p:sld xmlns:a="http://schemas.openxmlformats.org/drawingml/2006/main" xmlns:r="http://schemas.openxmlformats.org/officeDocument/2006/relationships" xmlns:p="http://schemas.openxmlformats.org/presentationml/2006/main">
   <p:cSld>
     <p:spTree>
@@ -5423,7 +6032,7 @@
 </p:sld>
 </file>
 
-<file path=ppt/slides/slide6.xml><?xml version="1.0" encoding="utf-8"?>
+<file path=ppt/slides/slide7.xml><?xml version="1.0" encoding="utf-8"?>
 <p:sld xmlns:a="http://schemas.openxmlformats.org/drawingml/2006/main" xmlns:r="http://schemas.openxmlformats.org/officeDocument/2006/relationships" xmlns:p="http://schemas.openxmlformats.org/presentationml/2006/main">
   <p:cSld>
     <p:spTree>
@@ -5505,7 +6114,7 @@
 </p:sld>
 </file>
 
-<file path=ppt/slides/slide7.xml><?xml version="1.0" encoding="utf-8"?>
+<file path=ppt/slides/slide8.xml><?xml version="1.0" encoding="utf-8"?>
 <p:sld xmlns:a="http://schemas.openxmlformats.org/drawingml/2006/main" xmlns:r="http://schemas.openxmlformats.org/officeDocument/2006/relationships" xmlns:p="http://schemas.openxmlformats.org/presentationml/2006/main">
   <p:cSld>
     <p:spTree>
@@ -5587,7 +6196,7 @@
 </p:sld>
 </file>
 
-<file path=ppt/slides/slide8.xml><?xml version="1.0" encoding="utf-8"?>
+<file path=ppt/slides/slide9.xml><?xml version="1.0" encoding="utf-8"?>
 <p:sld xmlns:a="http://schemas.openxmlformats.org/drawingml/2006/main" xmlns:r="http://schemas.openxmlformats.org/officeDocument/2006/relationships" xmlns:p="http://schemas.openxmlformats.org/presentationml/2006/main">
   <p:cSld>
     <p:spTree>
@@ -5660,119 +6269,6 @@
     <p:extLst>
       <p:ext uri="{BB962C8B-B14F-4D97-AF65-F5344CB8AC3E}">
         <p14:creationId xmlns:p14="http://schemas.microsoft.com/office/powerpoint/2010/main" val="1216995418"/>
-      </p:ext>
-    </p:extLst>
-  </p:cSld>
-  <p:clrMapOvr>
-    <a:masterClrMapping/>
-  </p:clrMapOvr>
-</p:sld>
-</file>
-
-<file path=ppt/slides/slide9.xml><?xml version="1.0" encoding="utf-8"?>
-<p:sld xmlns:a="http://schemas.openxmlformats.org/drawingml/2006/main" xmlns:r="http://schemas.openxmlformats.org/officeDocument/2006/relationships" xmlns:p="http://schemas.openxmlformats.org/presentationml/2006/main">
-  <p:cSld>
-    <p:spTree>
-      <p:nvGrpSpPr>
-        <p:cNvPr id="1" name=""/>
-        <p:cNvGrpSpPr/>
-        <p:nvPr/>
-      </p:nvGrpSpPr>
-      <p:grpSpPr>
-        <a:xfrm>
-          <a:off x="0" y="0"/>
-          <a:ext cx="0" cy="0"/>
-          <a:chOff x="0" y="0"/>
-          <a:chExt cx="0" cy="0"/>
-        </a:xfrm>
-      </p:grpSpPr>
-      <p:sp>
-        <p:nvSpPr>
-          <p:cNvPr id="2" name="Title 1"/>
-          <p:cNvSpPr>
-            <a:spLocks noGrp="1"/>
-          </p:cNvSpPr>
-          <p:nvPr>
-            <p:ph type="title"/>
-          </p:nvPr>
-        </p:nvSpPr>
-        <p:spPr/>
-        <p:txBody>
-          <a:bodyPr/>
-          <a:lstStyle/>
-          <a:p>
-            <a:r>
-              <a:rPr lang="en-US" dirty="0" smtClean="0"/>
-              <a:t>Team 1 Criteria</a:t>
-            </a:r>
-            <a:endParaRPr lang="en-US" dirty="0"/>
-          </a:p>
-        </p:txBody>
-      </p:sp>
-      <p:sp>
-        <p:nvSpPr>
-          <p:cNvPr id="3" name="Content Placeholder 2"/>
-          <p:cNvSpPr>
-            <a:spLocks noGrp="1"/>
-          </p:cNvSpPr>
-          <p:nvPr>
-            <p:ph idx="1"/>
-          </p:nvPr>
-        </p:nvSpPr>
-        <p:spPr/>
-        <p:txBody>
-          <a:bodyPr/>
-          <a:lstStyle/>
-          <a:p>
-            <a:r>
-              <a:rPr lang="en-US" dirty="0" smtClean="0"/>
-              <a:t>Sub divided</a:t>
-            </a:r>
-            <a:endParaRPr lang="en-US" dirty="0"/>
-          </a:p>
-          <a:p>
-            <a:pPr lvl="1"/>
-            <a:r>
-              <a:rPr lang="en-US" dirty="0" smtClean="0"/>
-              <a:t>2 teams</a:t>
-            </a:r>
-            <a:endParaRPr lang="en-US" dirty="0"/>
-          </a:p>
-          <a:p>
-            <a:endParaRPr lang="en-US" dirty="0" smtClean="0"/>
-          </a:p>
-        </p:txBody>
-      </p:sp>
-      <p:sp>
-        <p:nvSpPr>
-          <p:cNvPr id="4" name="TextBox 3"/>
-          <p:cNvSpPr txBox="1"/>
-          <p:nvPr/>
-        </p:nvSpPr>
-        <p:spPr>
-          <a:xfrm>
-            <a:off x="3238500" y="2343150"/>
-            <a:ext cx="184731" cy="369332"/>
-          </a:xfrm>
-          <a:prstGeom prst="rect">
-            <a:avLst/>
-          </a:prstGeom>
-          <a:noFill/>
-        </p:spPr>
-        <p:txBody>
-          <a:bodyPr wrap="none" rtlCol="0">
-            <a:spAutoFit/>
-          </a:bodyPr>
-          <a:lstStyle/>
-          <a:p>
-            <a:endParaRPr lang="en-US" dirty="0"/>
-          </a:p>
-        </p:txBody>
-      </p:sp>
-    </p:spTree>
-    <p:extLst>
-      <p:ext uri="{BB962C8B-B14F-4D97-AF65-F5344CB8AC3E}">
-        <p14:creationId xmlns:p14="http://schemas.microsoft.com/office/powerpoint/2010/main" val="147267376"/>
       </p:ext>
     </p:extLst>
   </p:cSld>

</xml_diff>